<commit_message>
Mise en place de la connexion à la bdd + Ajout de composer avec altorouter et plates pour établir le routage dans Application.php et index.php + Création du système d'inscription et de connexion avec liens vers les views, affichage et traitement des données en AJAX. + Même principe pour l'espace personnel, liens des boutons, affichage des données et possibilité de modifier ses données perso. + Création du design du site  en mobile first avec media-queries et stylisation des fichiers css correspondant aux themes proposés dans l espace perso . + Rangement des fichiers dans des dossiers et nettoyage du code. + Fichiers annexes
</commit_message>
<xml_diff>
--- a/docs/P5 Projet personnel.pptx
+++ b/docs/P5 Projet personnel.pptx
@@ -249,7 +249,7 @@
           <a:p>
             <a:fld id="{E9F96418-4632-4F5E-BC7D-757031002FC3}" type="datetimeFigureOut">
               <a:rPr lang="fr-FR" smtClean="0"/>
-              <a:t>18/07/2018</a:t>
+              <a:t>19/07/2018</a:t>
             </a:fld>
             <a:endParaRPr lang="fr-FR"/>
           </a:p>
@@ -419,7 +419,7 @@
           <a:p>
             <a:fld id="{E9F96418-4632-4F5E-BC7D-757031002FC3}" type="datetimeFigureOut">
               <a:rPr lang="fr-FR" smtClean="0"/>
-              <a:t>18/07/2018</a:t>
+              <a:t>19/07/2018</a:t>
             </a:fld>
             <a:endParaRPr lang="fr-FR"/>
           </a:p>
@@ -599,7 +599,7 @@
           <a:p>
             <a:fld id="{E9F96418-4632-4F5E-BC7D-757031002FC3}" type="datetimeFigureOut">
               <a:rPr lang="fr-FR" smtClean="0"/>
-              <a:t>18/07/2018</a:t>
+              <a:t>19/07/2018</a:t>
             </a:fld>
             <a:endParaRPr lang="fr-FR"/>
           </a:p>
@@ -769,7 +769,7 @@
           <a:p>
             <a:fld id="{E9F96418-4632-4F5E-BC7D-757031002FC3}" type="datetimeFigureOut">
               <a:rPr lang="fr-FR" smtClean="0"/>
-              <a:t>18/07/2018</a:t>
+              <a:t>19/07/2018</a:t>
             </a:fld>
             <a:endParaRPr lang="fr-FR"/>
           </a:p>
@@ -1015,7 +1015,7 @@
           <a:p>
             <a:fld id="{E9F96418-4632-4F5E-BC7D-757031002FC3}" type="datetimeFigureOut">
               <a:rPr lang="fr-FR" smtClean="0"/>
-              <a:t>18/07/2018</a:t>
+              <a:t>19/07/2018</a:t>
             </a:fld>
             <a:endParaRPr lang="fr-FR"/>
           </a:p>
@@ -1247,7 +1247,7 @@
           <a:p>
             <a:fld id="{E9F96418-4632-4F5E-BC7D-757031002FC3}" type="datetimeFigureOut">
               <a:rPr lang="fr-FR" smtClean="0"/>
-              <a:t>18/07/2018</a:t>
+              <a:t>19/07/2018</a:t>
             </a:fld>
             <a:endParaRPr lang="fr-FR"/>
           </a:p>
@@ -1614,7 +1614,7 @@
           <a:p>
             <a:fld id="{E9F96418-4632-4F5E-BC7D-757031002FC3}" type="datetimeFigureOut">
               <a:rPr lang="fr-FR" smtClean="0"/>
-              <a:t>18/07/2018</a:t>
+              <a:t>19/07/2018</a:t>
             </a:fld>
             <a:endParaRPr lang="fr-FR"/>
           </a:p>
@@ -1732,7 +1732,7 @@
           <a:p>
             <a:fld id="{E9F96418-4632-4F5E-BC7D-757031002FC3}" type="datetimeFigureOut">
               <a:rPr lang="fr-FR" smtClean="0"/>
-              <a:t>18/07/2018</a:t>
+              <a:t>19/07/2018</a:t>
             </a:fld>
             <a:endParaRPr lang="fr-FR"/>
           </a:p>
@@ -1827,7 +1827,7 @@
           <a:p>
             <a:fld id="{E9F96418-4632-4F5E-BC7D-757031002FC3}" type="datetimeFigureOut">
               <a:rPr lang="fr-FR" smtClean="0"/>
-              <a:t>18/07/2018</a:t>
+              <a:t>19/07/2018</a:t>
             </a:fld>
             <a:endParaRPr lang="fr-FR"/>
           </a:p>
@@ -2104,7 +2104,7 @@
           <a:p>
             <a:fld id="{E9F96418-4632-4F5E-BC7D-757031002FC3}" type="datetimeFigureOut">
               <a:rPr lang="fr-FR" smtClean="0"/>
-              <a:t>18/07/2018</a:t>
+              <a:t>19/07/2018</a:t>
             </a:fld>
             <a:endParaRPr lang="fr-FR"/>
           </a:p>
@@ -2357,7 +2357,7 @@
           <a:p>
             <a:fld id="{E9F96418-4632-4F5E-BC7D-757031002FC3}" type="datetimeFigureOut">
               <a:rPr lang="fr-FR" smtClean="0"/>
-              <a:t>18/07/2018</a:t>
+              <a:t>19/07/2018</a:t>
             </a:fld>
             <a:endParaRPr lang="fr-FR"/>
           </a:p>
@@ -2570,7 +2570,7 @@
           <a:p>
             <a:fld id="{E9F96418-4632-4F5E-BC7D-757031002FC3}" type="datetimeFigureOut">
               <a:rPr lang="fr-FR" smtClean="0"/>
-              <a:t>18/07/2018</a:t>
+              <a:t>19/07/2018</a:t>
             </a:fld>
             <a:endParaRPr lang="fr-FR"/>
           </a:p>

</xml_diff>